<commit_message>
Nueva versión del diagrama lógico.
</commit_message>
<xml_diff>
--- a/Resources/Diagramm.pptx
+++ b/Resources/Diagramm.pptx
@@ -6,6 +6,7 @@
   </p:sldMasterIdLst>
   <p:sldIdLst>
     <p:sldId id="256" r:id="rId3"/>
+    <p:sldId id="257" r:id="rId4"/>
   </p:sldIdLst>
   <p:sldSz cx="5670550" cy="10080625"/>
   <p:notesSz cx="7559675" cy="10691813"/>
@@ -63,7 +64,7 @@
         <p:txBody>
           <a:bodyPr/>
           <a:p>
-            <a:fld id="{7CC37A95-A200-4605-A537-E382309D5C04}" type="slidenum">
+            <a:fld id="{BBFFE4BB-DA7B-4B39-9F54-D936131C1895}" type="slidenum">
               <a:t>&lt;#&gt;</a:t>
             </a:fld>
           </a:p>
@@ -251,7 +252,7 @@
         <p:txBody>
           <a:bodyPr/>
           <a:p>
-            <a:fld id="{1A70A726-2256-4771-A650-E3857E520F9A}" type="slidenum">
+            <a:fld id="{1A4C97B1-0BBE-42D4-AEB7-79FB0D78E607}" type="slidenum">
               <a:t>&lt;#&gt;</a:t>
             </a:fld>
           </a:p>
@@ -507,7 +508,7 @@
         <p:txBody>
           <a:bodyPr/>
           <a:p>
-            <a:fld id="{D70F7E66-FC23-41B3-A0C6-D7FC7DC69E03}" type="slidenum">
+            <a:fld id="{A37622D8-905A-494B-9AD2-41FCE2AE851F}" type="slidenum">
               <a:t>&lt;#&gt;</a:t>
             </a:fld>
           </a:p>
@@ -831,7 +832,7 @@
         <p:txBody>
           <a:bodyPr/>
           <a:p>
-            <a:fld id="{87E1B30B-927A-47A0-81BB-5EB9F2D9C6ED}" type="slidenum">
+            <a:fld id="{FAA4677E-3BBC-495D-92CA-34A8DD4AFF1C}" type="slidenum">
               <a:t>&lt;#&gt;</a:t>
             </a:fld>
           </a:p>
@@ -988,7 +989,7 @@
         <p:txBody>
           <a:bodyPr/>
           <a:p>
-            <a:fld id="{2CEB20DC-C8B1-4947-928A-EB319D02F8AF}" type="slidenum">
+            <a:fld id="{152E068C-9FCC-4718-B2DD-088FC3F4DA67}" type="slidenum">
               <a:t>&lt;#&gt;</a:t>
             </a:fld>
           </a:p>
@@ -1142,7 +1143,7 @@
         <p:txBody>
           <a:bodyPr/>
           <a:p>
-            <a:fld id="{B6641640-0626-43DA-B14F-41ADD990809B}" type="slidenum">
+            <a:fld id="{242C9126-BA18-4403-BAFD-698455CE8982}" type="slidenum">
               <a:t>&lt;#&gt;</a:t>
             </a:fld>
           </a:p>
@@ -1330,7 +1331,7 @@
         <p:txBody>
           <a:bodyPr/>
           <a:p>
-            <a:fld id="{4FFDC5C9-FC1D-4AD3-8F5F-E5E2B04E2698}" type="slidenum">
+            <a:fld id="{CA2B03C4-411F-42C6-A1FD-56E00E5F392F}" type="slidenum">
               <a:t>&lt;#&gt;</a:t>
             </a:fld>
           </a:p>
@@ -1450,7 +1451,7 @@
         <p:txBody>
           <a:bodyPr/>
           <a:p>
-            <a:fld id="{96089BD3-6496-4F09-9D7D-40936BAC963C}" type="slidenum">
+            <a:fld id="{38FD5F2B-B723-40D0-8DD4-D041DA277E5D}" type="slidenum">
               <a:t>&lt;#&gt;</a:t>
             </a:fld>
           </a:p>
@@ -1570,7 +1571,7 @@
         <p:txBody>
           <a:bodyPr/>
           <a:p>
-            <a:fld id="{5490B13A-41E3-45EE-920F-2C25870852FF}" type="slidenum">
+            <a:fld id="{EB2AF2E0-7D12-4B69-A554-9B8FBFE94500}" type="slidenum">
               <a:t>&lt;#&gt;</a:t>
             </a:fld>
           </a:p>
@@ -1792,7 +1793,7 @@
         <p:txBody>
           <a:bodyPr/>
           <a:p>
-            <a:fld id="{0344A491-FE10-4D48-9797-59C6D9D68306}" type="slidenum">
+            <a:fld id="{B5B26D86-9EB3-4E04-AA57-F779EBDCE1B6}" type="slidenum">
               <a:t>&lt;#&gt;</a:t>
             </a:fld>
           </a:p>
@@ -2014,7 +2015,7 @@
         <p:txBody>
           <a:bodyPr/>
           <a:p>
-            <a:fld id="{60C56FE7-E85A-4095-8FBE-BC86738A5ED7}" type="slidenum">
+            <a:fld id="{7A7DC19E-D578-4CD2-B272-620812A384B3}" type="slidenum">
               <a:t>&lt;#&gt;</a:t>
             </a:fld>
           </a:p>
@@ -2236,7 +2237,7 @@
         <p:txBody>
           <a:bodyPr/>
           <a:p>
-            <a:fld id="{121AF61A-27CF-4EAF-BBB3-55436DB9F55E}" type="slidenum">
+            <a:fld id="{900546A6-E8CE-4A8A-9016-2CEF2AC1F149}" type="slidenum">
               <a:t>&lt;#&gt;</a:t>
             </a:fld>
           </a:p>
@@ -2320,7 +2321,151 @@
               <a:rPr b="0" lang="es-ES" sz="7819" spc="-1" strike="noStrike">
                 <a:latin typeface="Arial"/>
               </a:rPr>
-              <a:t>Click to edit the title text format</a:t>
+              <a:t>C</a:t>
+            </a:r>
+            <a:r>
+              <a:rPr b="0" lang="es-ES" sz="7819" spc="-1" strike="noStrike">
+                <a:latin typeface="Arial"/>
+              </a:rPr>
+              <a:t>li</a:t>
+            </a:r>
+            <a:r>
+              <a:rPr b="0" lang="es-ES" sz="7819" spc="-1" strike="noStrike">
+                <a:latin typeface="Arial"/>
+              </a:rPr>
+              <a:t>c</a:t>
+            </a:r>
+            <a:r>
+              <a:rPr b="0" lang="es-ES" sz="7819" spc="-1" strike="noStrike">
+                <a:latin typeface="Arial"/>
+              </a:rPr>
+              <a:t>k </a:t>
+            </a:r>
+            <a:r>
+              <a:rPr b="0" lang="es-ES" sz="7819" spc="-1" strike="noStrike">
+                <a:latin typeface="Arial"/>
+              </a:rPr>
+              <a:t>t</a:t>
+            </a:r>
+            <a:r>
+              <a:rPr b="0" lang="es-ES" sz="7819" spc="-1" strike="noStrike">
+                <a:latin typeface="Arial"/>
+              </a:rPr>
+              <a:t>o </a:t>
+            </a:r>
+            <a:r>
+              <a:rPr b="0" lang="es-ES" sz="7819" spc="-1" strike="noStrike">
+                <a:latin typeface="Arial"/>
+              </a:rPr>
+              <a:t>e</a:t>
+            </a:r>
+            <a:r>
+              <a:rPr b="0" lang="es-ES" sz="7819" spc="-1" strike="noStrike">
+                <a:latin typeface="Arial"/>
+              </a:rPr>
+              <a:t>d</a:t>
+            </a:r>
+            <a:r>
+              <a:rPr b="0" lang="es-ES" sz="7819" spc="-1" strike="noStrike">
+                <a:latin typeface="Arial"/>
+              </a:rPr>
+              <a:t>it </a:t>
+            </a:r>
+            <a:r>
+              <a:rPr b="0" lang="es-ES" sz="7819" spc="-1" strike="noStrike">
+                <a:latin typeface="Arial"/>
+              </a:rPr>
+              <a:t>t</a:t>
+            </a:r>
+            <a:r>
+              <a:rPr b="0" lang="es-ES" sz="7819" spc="-1" strike="noStrike">
+                <a:latin typeface="Arial"/>
+              </a:rPr>
+              <a:t>h</a:t>
+            </a:r>
+            <a:r>
+              <a:rPr b="0" lang="es-ES" sz="7819" spc="-1" strike="noStrike">
+                <a:latin typeface="Arial"/>
+              </a:rPr>
+              <a:t>e </a:t>
+            </a:r>
+            <a:r>
+              <a:rPr b="0" lang="es-ES" sz="7819" spc="-1" strike="noStrike">
+                <a:latin typeface="Arial"/>
+              </a:rPr>
+              <a:t>ti</a:t>
+            </a:r>
+            <a:r>
+              <a:rPr b="0" lang="es-ES" sz="7819" spc="-1" strike="noStrike">
+                <a:latin typeface="Arial"/>
+              </a:rPr>
+              <a:t>tl</a:t>
+            </a:r>
+            <a:r>
+              <a:rPr b="0" lang="es-ES" sz="7819" spc="-1" strike="noStrike">
+                <a:latin typeface="Arial"/>
+              </a:rPr>
+              <a:t>e </a:t>
+            </a:r>
+            <a:r>
+              <a:rPr b="0" lang="es-ES" sz="7819" spc="-1" strike="noStrike">
+                <a:latin typeface="Arial"/>
+              </a:rPr>
+              <a:t>t</a:t>
+            </a:r>
+            <a:r>
+              <a:rPr b="0" lang="es-ES" sz="7819" spc="-1" strike="noStrike">
+                <a:latin typeface="Arial"/>
+              </a:rPr>
+              <a:t>e</a:t>
+            </a:r>
+            <a:r>
+              <a:rPr b="0" lang="es-ES" sz="7819" spc="-1" strike="noStrike">
+                <a:latin typeface="Arial"/>
+              </a:rPr>
+              <a:t>x</a:t>
+            </a:r>
+            <a:r>
+              <a:rPr b="0" lang="es-ES" sz="7819" spc="-1" strike="noStrike">
+                <a:latin typeface="Arial"/>
+              </a:rPr>
+              <a:t>t </a:t>
+            </a:r>
+            <a:r>
+              <a:rPr b="0" lang="es-ES" sz="7819" spc="-1" strike="noStrike">
+                <a:latin typeface="Arial"/>
+              </a:rPr>
+              <a:t>f</a:t>
+            </a:r>
+            <a:r>
+              <a:rPr b="0" lang="es-ES" sz="7819" spc="-1" strike="noStrike">
+                <a:latin typeface="Arial"/>
+              </a:rPr>
+              <a:t>o</a:t>
+            </a:r>
+            <a:r>
+              <a:rPr b="0" lang="es-ES" sz="7819" spc="-1" strike="noStrike">
+                <a:latin typeface="Arial"/>
+              </a:rPr>
+              <a:t>r</a:t>
+            </a:r>
+            <a:r>
+              <a:rPr b="0" lang="es-ES" sz="7819" spc="-1" strike="noStrike">
+                <a:latin typeface="Arial"/>
+              </a:rPr>
+              <a:t>m</a:t>
+            </a:r>
+            <a:r>
+              <a:rPr b="0" lang="es-ES" sz="7819" spc="-1" strike="noStrike">
+                <a:latin typeface="Arial"/>
+              </a:rPr>
+              <a:t>a</a:t>
+            </a:r>
+            <a:r>
+              <a:rPr b="0" lang="es-ES" sz="7819" spc="-1" strike="noStrike">
+                <a:latin typeface="Arial"/>
+              </a:rPr>
+              <a:t>t</a:t>
             </a:r>
             <a:endParaRPr b="0" lang="es-ES" sz="7819" spc="-1" strike="noStrike">
               <a:latin typeface="Arial"/>
@@ -3536,7 +3681,7 @@
             <a:pPr algn="r">
               <a:buNone/>
             </a:pPr>
-            <a:fld id="{1461DC27-4D6D-469E-9B10-B290CD3C0315}" type="slidenum">
+            <a:fld id="{8BB42A9A-BE91-41E5-8265-B4EF9707B1DA}" type="slidenum">
               <a:rPr b="0" lang="es-ES" sz="1400" spc="-1" strike="noStrike">
                 <a:latin typeface="Times New Roman"/>
               </a:rPr>
@@ -4416,7 +4561,13 @@
               <a:rPr b="0" lang="es-ES" sz="1800" spc="-1" strike="noStrike">
                 <a:latin typeface="Arial"/>
               </a:rPr>
-              <a:t>No</a:t>
+              <a:t>N</a:t>
+            </a:r>
+            <a:r>
+              <a:rPr b="0" lang="es-ES" sz="1800" spc="-1" strike="noStrike">
+                <a:latin typeface="Arial"/>
+              </a:rPr>
+              <a:t>o</a:t>
             </a:r>
             <a:endParaRPr b="0" lang="es-ES" sz="1800" spc="-1" strike="noStrike">
               <a:latin typeface="Arial"/>
@@ -4452,7 +4603,19 @@
               <a:rPr b="0" lang="es-ES" sz="1800" spc="-1" strike="noStrike">
                 <a:latin typeface="Arial"/>
               </a:rPr>
-              <a:t>Yes</a:t>
+              <a:t>Y</a:t>
+            </a:r>
+            <a:r>
+              <a:rPr b="0" lang="es-ES" sz="1800" spc="-1" strike="noStrike">
+                <a:latin typeface="Arial"/>
+              </a:rPr>
+              <a:t>e</a:t>
+            </a:r>
+            <a:r>
+              <a:rPr b="0" lang="es-ES" sz="1800" spc="-1" strike="noStrike">
+                <a:latin typeface="Arial"/>
+              </a:rPr>
+              <a:t>s</a:t>
             </a:r>
             <a:endParaRPr b="0" lang="es-ES" sz="1800" spc="-1" strike="noStrike">
               <a:latin typeface="Arial"/>
@@ -4659,7 +4822,19 @@
               <a:rPr b="0" lang="es-ES" sz="1800" spc="-1" strike="noStrike">
                 <a:latin typeface="Arial"/>
               </a:rPr>
-              <a:t>Yes</a:t>
+              <a:t>Y</a:t>
+            </a:r>
+            <a:r>
+              <a:rPr b="0" lang="es-ES" sz="1800" spc="-1" strike="noStrike">
+                <a:latin typeface="Arial"/>
+              </a:rPr>
+              <a:t>e</a:t>
+            </a:r>
+            <a:r>
+              <a:rPr b="0" lang="es-ES" sz="1800" spc="-1" strike="noStrike">
+                <a:latin typeface="Arial"/>
+              </a:rPr>
+              <a:t>s</a:t>
             </a:r>
             <a:endParaRPr b="0" lang="es-ES" sz="1800" spc="-1" strike="noStrike">
               <a:latin typeface="Arial"/>
@@ -4696,6 +4871,972 @@
                 <a:latin typeface="Arial"/>
               </a:rPr>
               <a:t>No</a:t>
+            </a:r>
+            <a:endParaRPr b="0" lang="es-ES" sz="1800" spc="-1" strike="noStrike">
+              <a:latin typeface="Arial"/>
+            </a:endParaRPr>
+          </a:p>
+        </p:txBody>
+      </p:sp>
+      <p:sp>
+        <p:nvSpPr>
+          <p:cNvPr id="69" name=""/>
+          <p:cNvSpPr txBox="1"/>
+          <p:nvPr/>
+        </p:nvSpPr>
+        <p:spPr>
+          <a:xfrm>
+            <a:off x="3068280" y="199440"/>
+            <a:ext cx="2340000" cy="2581560"/>
+          </a:xfrm>
+          <a:prstGeom prst="rect">
+            <a:avLst/>
+          </a:prstGeom>
+          <a:noFill/>
+          <a:ln w="0">
+            <a:noFill/>
+          </a:ln>
+        </p:spPr>
+        <p:txBody>
+          <a:bodyPr lIns="18000" rIns="18000" tIns="10800" bIns="10800" anchor="t">
+            <a:noAutofit/>
+          </a:bodyPr>
+          <a:p>
+            <a:r>
+              <a:rPr b="0" lang="es-ES" sz="1800" spc="-1" strike="noStrike">
+                <a:latin typeface="Arial"/>
+              </a:rPr>
+              <a:t>Opción 1_ El servidor recibe un request y se le envía la informacion reuqerida. </a:t>
+            </a:r>
+            <a:endParaRPr b="0" lang="es-ES" sz="1800" spc="-1" strike="noStrike">
+              <a:latin typeface="Arial"/>
+            </a:endParaRPr>
+          </a:p>
+          <a:p>
+            <a:r>
+              <a:rPr b="0" lang="es-ES" sz="1800" spc="-1" strike="noStrike">
+                <a:latin typeface="Arial"/>
+              </a:rPr>
+              <a:t>Posteriormente se queda a la espera de recibir mas peticiones del mismo nodo (No estoy muy seguro de este último punto)</a:t>
+            </a:r>
+            <a:endParaRPr b="0" lang="es-ES" sz="1800" spc="-1" strike="noStrike">
+              <a:latin typeface="Arial"/>
+            </a:endParaRPr>
+          </a:p>
+        </p:txBody>
+      </p:sp>
+    </p:spTree>
+  </p:cSld>
+  <mc:AlternateContent>
+    <mc:Choice Requires="p14">
+      <p:transition spd="slow" p14:dur="2000"/>
+    </mc:Choice>
+    <mc:Fallback>
+      <p:transition spd="slow"/>
+    </mc:Fallback>
+  </mc:AlternateContent>
+</p:sld>
+</file>
+
+<file path=ppt/slides/slide2.xml><?xml version="1.0" encoding="utf-8"?>
+<p:sld xmlns:a="http://schemas.openxmlformats.org/drawingml/2006/main" xmlns:p="http://schemas.openxmlformats.org/presentationml/2006/main" xmlns:r="http://schemas.openxmlformats.org/officeDocument/2006/relationships" xmlns:p14="http://schemas.microsoft.com/office/powerpoint/2010/main" xmlns:p15="http://schemas.microsoft.com/office/powerpoint/2012/main" xmlns:mc="http://schemas.openxmlformats.org/markup-compatibility/2006">
+  <p:cSld>
+    <p:spTree>
+      <p:nvGrpSpPr>
+        <p:cNvPr id="1" name=""/>
+        <p:cNvGrpSpPr/>
+        <p:nvPr/>
+      </p:nvGrpSpPr>
+      <p:grpSpPr>
+        <a:xfrm>
+          <a:off x="0" y="0"/>
+          <a:ext cx="0" cy="0"/>
+          <a:chOff x="0" y="0"/>
+          <a:chExt cx="0" cy="0"/>
+        </a:xfrm>
+      </p:grpSpPr>
+      <p:sp>
+        <p:nvSpPr>
+          <p:cNvPr id="70" name=""/>
+          <p:cNvSpPr/>
+          <p:nvPr/>
+        </p:nvSpPr>
+        <p:spPr>
+          <a:xfrm>
+            <a:off x="1553040" y="369360"/>
+            <a:ext cx="1098000" cy="259920"/>
+          </a:xfrm>
+          <a:prstGeom prst="rect">
+            <a:avLst/>
+          </a:prstGeom>
+          <a:solidFill>
+            <a:srgbClr val="729fcf"/>
+          </a:solidFill>
+          <a:ln w="0">
+            <a:solidFill>
+              <a:srgbClr val="3465a4"/>
+            </a:solidFill>
+          </a:ln>
+        </p:spPr>
+        <p:style>
+          <a:lnRef idx="0"/>
+          <a:fillRef idx="0"/>
+          <a:effectRef idx="0"/>
+          <a:fontRef idx="minor"/>
+        </p:style>
+        <p:txBody>
+          <a:bodyPr lIns="18000" rIns="18000" tIns="10800" bIns="10800" anchor="ctr">
+            <a:noAutofit/>
+          </a:bodyPr>
+          <a:p>
+            <a:pPr algn="ctr">
+              <a:buNone/>
+            </a:pPr>
+            <a:r>
+              <a:rPr b="0" lang="en-US" sz="1000" spc="-1" strike="noStrike">
+                <a:latin typeface="Arial"/>
+              </a:rPr>
+              <a:t>Execute</a:t>
+            </a:r>
+            <a:r>
+              <a:rPr b="0" lang="es-ES" sz="1000" spc="-1" strike="noStrike">
+                <a:latin typeface="Arial"/>
+              </a:rPr>
+              <a:t> ./Websrv </a:t>
+            </a:r>
+            <a:r>
+              <a:rPr b="0" lang="es-ES" sz="1000" spc="-1" strike="noStrike">
+                <a:latin typeface="Arial"/>
+              </a:rPr>
+              <a:t>port</a:t>
+            </a:r>
+            <a:endParaRPr b="0" lang="es-ES" sz="1000" spc="-1" strike="noStrike">
+              <a:latin typeface="Arial"/>
+            </a:endParaRPr>
+          </a:p>
+        </p:txBody>
+      </p:sp>
+      <p:sp>
+        <p:nvSpPr>
+          <p:cNvPr id="71" name=""/>
+          <p:cNvSpPr/>
+          <p:nvPr/>
+        </p:nvSpPr>
+        <p:spPr>
+          <a:xfrm>
+            <a:off x="1350000" y="1200240"/>
+            <a:ext cx="1530000" cy="959760"/>
+          </a:xfrm>
+          <a:prstGeom prst="rect">
+            <a:avLst/>
+          </a:prstGeom>
+          <a:solidFill>
+            <a:srgbClr val="729fcf"/>
+          </a:solidFill>
+          <a:ln w="0">
+            <a:solidFill>
+              <a:srgbClr val="3465a4"/>
+            </a:solidFill>
+          </a:ln>
+        </p:spPr>
+        <p:style>
+          <a:lnRef idx="0"/>
+          <a:fillRef idx="0"/>
+          <a:effectRef idx="0"/>
+          <a:fontRef idx="minor"/>
+        </p:style>
+        <p:txBody>
+          <a:bodyPr lIns="18000" rIns="18000" tIns="10800" bIns="10800" anchor="ctr">
+            <a:noAutofit/>
+          </a:bodyPr>
+          <a:p>
+            <a:pPr algn="ctr">
+              <a:buNone/>
+            </a:pPr>
+            <a:r>
+              <a:rPr b="0" lang="es-ES" sz="1000" spc="-1" strike="noStrike">
+                <a:latin typeface="Arial"/>
+              </a:rPr>
+              <a:t>Open port TCP IP </a:t>
+            </a:r>
+            <a:endParaRPr b="0" lang="es-ES" sz="1000" spc="-1" strike="noStrike">
+              <a:latin typeface="Arial"/>
+            </a:endParaRPr>
+          </a:p>
+          <a:p>
+            <a:pPr algn="ctr">
+              <a:buNone/>
+            </a:pPr>
+            <a:r>
+              <a:rPr b="0" lang="es-ES" sz="1000" spc="-1" strike="noStrike">
+                <a:latin typeface="Arial"/>
+                <a:hlinkClick r:id="rId1"/>
+              </a:rPr>
+              <a:t>https://codereview.stackexchange.com/questions/155755/simple-and-effective-port-checker-in-c</a:t>
+            </a:r>
+            <a:endParaRPr b="0" lang="es-ES" sz="1000" spc="-1" strike="noStrike">
+              <a:latin typeface="Arial"/>
+            </a:endParaRPr>
+          </a:p>
+          <a:p>
+            <a:pPr algn="ctr">
+              <a:buNone/>
+            </a:pPr>
+            <a:endParaRPr b="0" lang="es-ES" sz="1000" spc="-1" strike="noStrike">
+              <a:latin typeface="Arial"/>
+            </a:endParaRPr>
+          </a:p>
+        </p:txBody>
+      </p:sp>
+      <p:cxnSp>
+        <p:nvCxnSpPr>
+          <p:cNvPr id="72" name=""/>
+          <p:cNvCxnSpPr>
+            <a:stCxn id="70" idx="2"/>
+            <a:endCxn id="71" idx="0"/>
+          </p:cNvCxnSpPr>
+          <p:nvPr/>
+        </p:nvCxnSpPr>
+        <p:spPr>
+          <a:xfrm>
+            <a:off x="2102040" y="629280"/>
+            <a:ext cx="13320" cy="571320"/>
+          </a:xfrm>
+          <a:prstGeom prst="straightConnector1">
+            <a:avLst/>
+          </a:prstGeom>
+          <a:ln w="0">
+            <a:solidFill>
+              <a:srgbClr val="3465a4"/>
+            </a:solidFill>
+            <a:tailEnd len="med" type="triangle" w="med"/>
+          </a:ln>
+        </p:spPr>
+      </p:cxnSp>
+      <p:cxnSp>
+        <p:nvCxnSpPr>
+          <p:cNvPr id="73" name=""/>
+          <p:cNvCxnSpPr>
+            <a:stCxn id="71" idx="2"/>
+          </p:cNvCxnSpPr>
+          <p:nvPr/>
+        </p:nvCxnSpPr>
+        <p:spPr>
+          <a:xfrm flipH="1">
+            <a:off x="2070000" y="2160000"/>
+            <a:ext cx="45360" cy="360360"/>
+          </a:xfrm>
+          <a:prstGeom prst="straightConnector1">
+            <a:avLst/>
+          </a:prstGeom>
+          <a:ln w="0">
+            <a:solidFill>
+              <a:srgbClr val="3465a4"/>
+            </a:solidFill>
+            <a:tailEnd len="med" type="triangle" w="med"/>
+          </a:ln>
+        </p:spPr>
+      </p:cxnSp>
+      <p:sp>
+        <p:nvSpPr>
+          <p:cNvPr id="74" name=""/>
+          <p:cNvSpPr/>
+          <p:nvPr/>
+        </p:nvSpPr>
+        <p:spPr>
+          <a:xfrm>
+            <a:off x="1440000" y="3448080"/>
+            <a:ext cx="1260000" cy="439920"/>
+          </a:xfrm>
+          <a:prstGeom prst="rect">
+            <a:avLst/>
+          </a:prstGeom>
+          <a:solidFill>
+            <a:srgbClr val="729fcf"/>
+          </a:solidFill>
+          <a:ln w="0">
+            <a:solidFill>
+              <a:srgbClr val="3465a4"/>
+            </a:solidFill>
+          </a:ln>
+        </p:spPr>
+        <p:style>
+          <a:lnRef idx="0"/>
+          <a:fillRef idx="0"/>
+          <a:effectRef idx="0"/>
+          <a:fontRef idx="minor"/>
+        </p:style>
+        <p:txBody>
+          <a:bodyPr lIns="18000" rIns="18000" tIns="10800" bIns="10800" anchor="ctr">
+            <a:noAutofit/>
+          </a:bodyPr>
+          <a:p>
+            <a:pPr algn="ctr">
+              <a:buNone/>
+            </a:pPr>
+            <a:r>
+              <a:rPr b="0" lang="es-ES" sz="1000" spc="-1" strike="noStrike">
+                <a:latin typeface="Arial"/>
+              </a:rPr>
+              <a:t>While loop</a:t>
+            </a:r>
+            <a:endParaRPr b="0" lang="es-ES" sz="1000" spc="-1" strike="noStrike">
+              <a:latin typeface="Arial"/>
+            </a:endParaRPr>
+          </a:p>
+        </p:txBody>
+      </p:sp>
+      <p:cxnSp>
+        <p:nvCxnSpPr>
+          <p:cNvPr id="75" name=""/>
+          <p:cNvCxnSpPr>
+            <a:endCxn id="74" idx="0"/>
+          </p:cNvCxnSpPr>
+          <p:nvPr/>
+        </p:nvCxnSpPr>
+        <p:spPr>
+          <a:xfrm>
+            <a:off x="2070000" y="3240000"/>
+            <a:ext cx="360" cy="208440"/>
+          </a:xfrm>
+          <a:prstGeom prst="straightConnector1">
+            <a:avLst/>
+          </a:prstGeom>
+          <a:ln w="0">
+            <a:solidFill>
+              <a:srgbClr val="3465a4"/>
+            </a:solidFill>
+            <a:tailEnd len="med" type="triangle" w="med"/>
+          </a:ln>
+        </p:spPr>
+      </p:cxnSp>
+      <p:sp>
+        <p:nvSpPr>
+          <p:cNvPr id="76" name=""/>
+          <p:cNvSpPr/>
+          <p:nvPr/>
+        </p:nvSpPr>
+        <p:spPr>
+          <a:xfrm>
+            <a:off x="1260000" y="4248000"/>
+            <a:ext cx="1440000" cy="1260000"/>
+          </a:xfrm>
+          <a:custGeom>
+            <a:avLst/>
+            <a:gdLst/>
+            <a:ahLst/>
+            <a:rect l="l" t="t" r="r" b="b"/>
+            <a:pathLst>
+              <a:path w="21600" h="21600">
+                <a:moveTo>
+                  <a:pt x="10800" y="0"/>
+                </a:moveTo>
+                <a:lnTo>
+                  <a:pt x="21600" y="10800"/>
+                </a:lnTo>
+                <a:lnTo>
+                  <a:pt x="10800" y="21600"/>
+                </a:lnTo>
+                <a:lnTo>
+                  <a:pt x="0" y="10800"/>
+                </a:lnTo>
+                <a:lnTo>
+                  <a:pt x="10800" y="0"/>
+                </a:lnTo>
+                <a:close/>
+              </a:path>
+            </a:pathLst>
+          </a:custGeom>
+          <a:solidFill>
+            <a:srgbClr val="729fcf"/>
+          </a:solidFill>
+          <a:ln w="0">
+            <a:solidFill>
+              <a:srgbClr val="3465a4"/>
+            </a:solidFill>
+          </a:ln>
+        </p:spPr>
+        <p:style>
+          <a:lnRef idx="0"/>
+          <a:fillRef idx="0"/>
+          <a:effectRef idx="0"/>
+          <a:fontRef idx="minor"/>
+        </p:style>
+        <p:txBody>
+          <a:bodyPr lIns="18000" rIns="18000" tIns="10800" bIns="10800" anchor="ctr">
+            <a:noAutofit/>
+          </a:bodyPr>
+          <a:p>
+            <a:pPr algn="ctr">
+              <a:buNone/>
+            </a:pPr>
+            <a:r>
+              <a:rPr b="0" lang="es-ES" sz="1000" spc="-1" strike="noStrike">
+                <a:latin typeface="Arial"/>
+              </a:rPr>
+              <a:t>Receive request</a:t>
+            </a:r>
+            <a:endParaRPr b="0" lang="es-ES" sz="1000" spc="-1" strike="noStrike">
+              <a:latin typeface="Arial"/>
+            </a:endParaRPr>
+          </a:p>
+        </p:txBody>
+      </p:sp>
+      <p:cxnSp>
+        <p:nvCxnSpPr>
+          <p:cNvPr id="77" name=""/>
+          <p:cNvCxnSpPr>
+            <a:stCxn id="76" idx="1"/>
+            <a:endCxn id="74" idx="1"/>
+          </p:cNvCxnSpPr>
+          <p:nvPr/>
+        </p:nvCxnSpPr>
+        <p:spPr>
+          <a:xfrm flipV="1">
+            <a:off x="1260000" y="3668040"/>
+            <a:ext cx="180360" cy="1210320"/>
+          </a:xfrm>
+          <a:prstGeom prst="straightConnector1">
+            <a:avLst/>
+          </a:prstGeom>
+          <a:ln w="0">
+            <a:solidFill>
+              <a:srgbClr val="3465a4"/>
+            </a:solidFill>
+            <a:tailEnd len="med" type="triangle" w="med"/>
+          </a:ln>
+        </p:spPr>
+      </p:cxnSp>
+      <p:sp>
+        <p:nvSpPr>
+          <p:cNvPr id="78" name=""/>
+          <p:cNvSpPr/>
+          <p:nvPr/>
+        </p:nvSpPr>
+        <p:spPr>
+          <a:xfrm>
+            <a:off x="1440000" y="2520000"/>
+            <a:ext cx="1260000" cy="720000"/>
+          </a:xfrm>
+          <a:custGeom>
+            <a:avLst/>
+            <a:gdLst/>
+            <a:ahLst/>
+            <a:rect l="l" t="t" r="r" b="b"/>
+            <a:pathLst>
+              <a:path w="21600" h="21600">
+                <a:moveTo>
+                  <a:pt x="10800" y="0"/>
+                </a:moveTo>
+                <a:lnTo>
+                  <a:pt x="21600" y="10800"/>
+                </a:lnTo>
+                <a:lnTo>
+                  <a:pt x="10800" y="21600"/>
+                </a:lnTo>
+                <a:lnTo>
+                  <a:pt x="0" y="10800"/>
+                </a:lnTo>
+                <a:lnTo>
+                  <a:pt x="10800" y="0"/>
+                </a:lnTo>
+                <a:close/>
+              </a:path>
+            </a:pathLst>
+          </a:custGeom>
+          <a:solidFill>
+            <a:srgbClr val="729fcf"/>
+          </a:solidFill>
+          <a:ln w="0">
+            <a:solidFill>
+              <a:srgbClr val="3465a4"/>
+            </a:solidFill>
+          </a:ln>
+        </p:spPr>
+        <p:style>
+          <a:lnRef idx="0"/>
+          <a:fillRef idx="0"/>
+          <a:effectRef idx="0"/>
+          <a:fontRef idx="minor"/>
+        </p:style>
+        <p:txBody>
+          <a:bodyPr lIns="18000" rIns="18000" tIns="10800" bIns="10800" anchor="ctr">
+            <a:noAutofit/>
+          </a:bodyPr>
+          <a:p>
+            <a:pPr algn="ctr">
+              <a:buNone/>
+            </a:pPr>
+            <a:r>
+              <a:rPr b="0" lang="es-ES" sz="1000" spc="-1" strike="noStrike">
+                <a:latin typeface="Arial"/>
+              </a:rPr>
+              <a:t>Open port is OK?</a:t>
+            </a:r>
+            <a:endParaRPr b="0" lang="es-ES" sz="1000" spc="-1" strike="noStrike">
+              <a:latin typeface="Arial"/>
+            </a:endParaRPr>
+          </a:p>
+        </p:txBody>
+      </p:sp>
+      <p:cxnSp>
+        <p:nvCxnSpPr>
+          <p:cNvPr id="79" name=""/>
+          <p:cNvCxnSpPr>
+            <a:stCxn id="78" idx="1"/>
+            <a:endCxn id="71" idx="1"/>
+          </p:cNvCxnSpPr>
+          <p:nvPr/>
+        </p:nvCxnSpPr>
+        <p:spPr>
+          <a:xfrm flipH="1" flipV="1">
+            <a:off x="1350000" y="1680120"/>
+            <a:ext cx="90360" cy="1200240"/>
+          </a:xfrm>
+          <a:prstGeom prst="straightConnector1">
+            <a:avLst/>
+          </a:prstGeom>
+          <a:ln w="0">
+            <a:solidFill>
+              <a:srgbClr val="3465a4"/>
+            </a:solidFill>
+            <a:tailEnd len="med" type="triangle" w="med"/>
+          </a:ln>
+        </p:spPr>
+      </p:cxnSp>
+      <p:cxnSp>
+        <p:nvCxnSpPr>
+          <p:cNvPr id="80" name=""/>
+          <p:cNvCxnSpPr>
+            <a:stCxn id="74" idx="2"/>
+            <a:endCxn id="76" idx="0"/>
+          </p:cNvCxnSpPr>
+          <p:nvPr/>
+        </p:nvCxnSpPr>
+        <p:spPr>
+          <a:xfrm flipH="1">
+            <a:off x="1980000" y="3888000"/>
+            <a:ext cx="90360" cy="360360"/>
+          </a:xfrm>
+          <a:prstGeom prst="straightConnector1">
+            <a:avLst/>
+          </a:prstGeom>
+          <a:ln w="0">
+            <a:solidFill>
+              <a:srgbClr val="3465a4"/>
+            </a:solidFill>
+            <a:tailEnd len="med" type="triangle" w="med"/>
+          </a:ln>
+        </p:spPr>
+      </p:cxnSp>
+      <p:sp>
+        <p:nvSpPr>
+          <p:cNvPr id="81" name=""/>
+          <p:cNvSpPr/>
+          <p:nvPr/>
+        </p:nvSpPr>
+        <p:spPr>
+          <a:xfrm>
+            <a:off x="2268000" y="5472000"/>
+            <a:ext cx="1260000" cy="540000"/>
+          </a:xfrm>
+          <a:prstGeom prst="rect">
+            <a:avLst/>
+          </a:prstGeom>
+          <a:solidFill>
+            <a:srgbClr val="729fcf"/>
+          </a:solidFill>
+          <a:ln w="0">
+            <a:solidFill>
+              <a:srgbClr val="3465a4"/>
+            </a:solidFill>
+          </a:ln>
+        </p:spPr>
+        <p:style>
+          <a:lnRef idx="0"/>
+          <a:fillRef idx="0"/>
+          <a:effectRef idx="0"/>
+          <a:fontRef idx="minor"/>
+        </p:style>
+        <p:txBody>
+          <a:bodyPr lIns="18000" rIns="18000" tIns="10800" bIns="10800" anchor="ctr">
+            <a:noAutofit/>
+          </a:bodyPr>
+          <a:p>
+            <a:pPr algn="ctr">
+              <a:buNone/>
+            </a:pPr>
+            <a:r>
+              <a:rPr b="0" lang="es-ES" sz="1000" spc="-1" strike="noStrike">
+                <a:latin typeface="Arial"/>
+              </a:rPr>
+              <a:t>Open new thread</a:t>
+            </a:r>
+            <a:endParaRPr b="0" lang="es-ES" sz="1000" spc="-1" strike="noStrike">
+              <a:latin typeface="Arial"/>
+            </a:endParaRPr>
+          </a:p>
+        </p:txBody>
+      </p:sp>
+      <p:sp>
+        <p:nvSpPr>
+          <p:cNvPr id="82" name=""/>
+          <p:cNvSpPr/>
+          <p:nvPr/>
+        </p:nvSpPr>
+        <p:spPr>
+          <a:xfrm>
+            <a:off x="2268000" y="6472080"/>
+            <a:ext cx="1260000" cy="439920"/>
+          </a:xfrm>
+          <a:prstGeom prst="rect">
+            <a:avLst/>
+          </a:prstGeom>
+          <a:solidFill>
+            <a:srgbClr val="729fcf"/>
+          </a:solidFill>
+          <a:ln w="0">
+            <a:solidFill>
+              <a:srgbClr val="3465a4"/>
+            </a:solidFill>
+          </a:ln>
+        </p:spPr>
+        <p:style>
+          <a:lnRef idx="0"/>
+          <a:fillRef idx="0"/>
+          <a:effectRef idx="0"/>
+          <a:fontRef idx="minor"/>
+        </p:style>
+        <p:txBody>
+          <a:bodyPr lIns="18000" rIns="18000" tIns="10800" bIns="10800" anchor="ctr">
+            <a:noAutofit/>
+          </a:bodyPr>
+          <a:p>
+            <a:pPr algn="ctr">
+              <a:buNone/>
+            </a:pPr>
+            <a:r>
+              <a:rPr b="0" lang="es-ES" sz="1000" spc="-1" strike="noStrike">
+                <a:latin typeface="Arial"/>
+              </a:rPr>
+              <a:t>Analyze request GET, POST, HEAD</a:t>
+            </a:r>
+            <a:endParaRPr b="0" lang="es-ES" sz="1000" spc="-1" strike="noStrike">
+              <a:latin typeface="Arial"/>
+            </a:endParaRPr>
+          </a:p>
+        </p:txBody>
+      </p:sp>
+      <p:cxnSp>
+        <p:nvCxnSpPr>
+          <p:cNvPr id="83" name=""/>
+          <p:cNvCxnSpPr>
+            <a:stCxn id="81" idx="2"/>
+            <a:endCxn id="82" idx="0"/>
+          </p:cNvCxnSpPr>
+          <p:nvPr/>
+        </p:nvCxnSpPr>
+        <p:spPr>
+          <a:xfrm>
+            <a:off x="2898000" y="6012000"/>
+            <a:ext cx="360" cy="460440"/>
+          </a:xfrm>
+          <a:prstGeom prst="straightConnector1">
+            <a:avLst/>
+          </a:prstGeom>
+          <a:ln w="0">
+            <a:solidFill>
+              <a:srgbClr val="3465a4"/>
+            </a:solidFill>
+            <a:tailEnd len="med" type="triangle" w="med"/>
+          </a:ln>
+        </p:spPr>
+      </p:cxnSp>
+      <p:cxnSp>
+        <p:nvCxnSpPr>
+          <p:cNvPr id="84" name=""/>
+          <p:cNvCxnSpPr>
+            <a:stCxn id="76" idx="3"/>
+            <a:endCxn id="81" idx="0"/>
+          </p:cNvCxnSpPr>
+          <p:nvPr/>
+        </p:nvCxnSpPr>
+        <p:spPr>
+          <a:xfrm>
+            <a:off x="2700000" y="4878000"/>
+            <a:ext cx="198360" cy="594360"/>
+          </a:xfrm>
+          <a:prstGeom prst="straightConnector1">
+            <a:avLst/>
+          </a:prstGeom>
+          <a:ln w="0">
+            <a:solidFill>
+              <a:srgbClr val="3465a4"/>
+            </a:solidFill>
+            <a:tailEnd len="med" type="triangle" w="med"/>
+          </a:ln>
+        </p:spPr>
+      </p:cxnSp>
+      <p:sp>
+        <p:nvSpPr>
+          <p:cNvPr id="85" name=""/>
+          <p:cNvSpPr/>
+          <p:nvPr/>
+        </p:nvSpPr>
+        <p:spPr>
+          <a:xfrm>
+            <a:off x="2262600" y="7710480"/>
+            <a:ext cx="1260000" cy="439920"/>
+          </a:xfrm>
+          <a:prstGeom prst="rect">
+            <a:avLst/>
+          </a:prstGeom>
+          <a:solidFill>
+            <a:srgbClr val="729fcf"/>
+          </a:solidFill>
+          <a:ln w="0">
+            <a:solidFill>
+              <a:srgbClr val="3465a4"/>
+            </a:solidFill>
+          </a:ln>
+        </p:spPr>
+        <p:style>
+          <a:lnRef idx="0"/>
+          <a:fillRef idx="0"/>
+          <a:effectRef idx="0"/>
+          <a:fontRef idx="minor"/>
+        </p:style>
+        <p:txBody>
+          <a:bodyPr lIns="18000" rIns="18000" tIns="10800" bIns="10800" anchor="ctr">
+            <a:noAutofit/>
+          </a:bodyPr>
+          <a:p>
+            <a:pPr algn="ctr">
+              <a:buNone/>
+            </a:pPr>
+            <a:r>
+              <a:rPr b="0" lang="es-ES" sz="1000" spc="-1" strike="noStrike">
+                <a:latin typeface="Arial"/>
+              </a:rPr>
+              <a:t>Send rewquest </a:t>
+            </a:r>
+            <a:endParaRPr b="0" lang="es-ES" sz="1000" spc="-1" strike="noStrike">
+              <a:latin typeface="Arial"/>
+            </a:endParaRPr>
+          </a:p>
+        </p:txBody>
+      </p:sp>
+      <p:cxnSp>
+        <p:nvCxnSpPr>
+          <p:cNvPr id="86" name=""/>
+          <p:cNvCxnSpPr>
+            <a:stCxn id="82" idx="2"/>
+            <a:endCxn id="85" idx="0"/>
+          </p:cNvCxnSpPr>
+          <p:nvPr/>
+        </p:nvCxnSpPr>
+        <p:spPr>
+          <a:xfrm flipH="1">
+            <a:off x="2892600" y="6912000"/>
+            <a:ext cx="5760" cy="798840"/>
+          </a:xfrm>
+          <a:prstGeom prst="straightConnector1">
+            <a:avLst/>
+          </a:prstGeom>
+          <a:ln w="0">
+            <a:solidFill>
+              <a:srgbClr val="3465a4"/>
+            </a:solidFill>
+            <a:tailEnd len="med" type="triangle" w="med"/>
+          </a:ln>
+        </p:spPr>
+      </p:cxnSp>
+      <p:sp>
+        <p:nvSpPr>
+          <p:cNvPr id="87" name=""/>
+          <p:cNvSpPr txBox="1"/>
+          <p:nvPr/>
+        </p:nvSpPr>
+        <p:spPr>
+          <a:xfrm>
+            <a:off x="720000" y="4968000"/>
+            <a:ext cx="540000" cy="533880"/>
+          </a:xfrm>
+          <a:prstGeom prst="rect">
+            <a:avLst/>
+          </a:prstGeom>
+          <a:noFill/>
+          <a:ln w="0">
+            <a:noFill/>
+          </a:ln>
+        </p:spPr>
+        <p:txBody>
+          <a:bodyPr lIns="18000" rIns="18000" tIns="10800" bIns="10800" anchor="t">
+            <a:noAutofit/>
+          </a:bodyPr>
+          <a:p>
+            <a:r>
+              <a:rPr b="0" lang="es-ES" sz="1800" spc="-1" strike="noStrike">
+                <a:latin typeface="Arial"/>
+              </a:rPr>
+              <a:t>No</a:t>
+            </a:r>
+            <a:endParaRPr b="0" lang="es-ES" sz="1800" spc="-1" strike="noStrike">
+              <a:latin typeface="Arial"/>
+            </a:endParaRPr>
+          </a:p>
+        </p:txBody>
+      </p:sp>
+      <p:sp>
+        <p:nvSpPr>
+          <p:cNvPr id="88" name=""/>
+          <p:cNvSpPr txBox="1"/>
+          <p:nvPr/>
+        </p:nvSpPr>
+        <p:spPr>
+          <a:xfrm>
+            <a:off x="3060000" y="4680000"/>
+            <a:ext cx="720000" cy="533880"/>
+          </a:xfrm>
+          <a:prstGeom prst="rect">
+            <a:avLst/>
+          </a:prstGeom>
+          <a:noFill/>
+          <a:ln w="0">
+            <a:noFill/>
+          </a:ln>
+        </p:spPr>
+        <p:txBody>
+          <a:bodyPr lIns="18000" rIns="18000" tIns="10800" bIns="10800" anchor="t">
+            <a:noAutofit/>
+          </a:bodyPr>
+          <a:p>
+            <a:r>
+              <a:rPr b="0" lang="es-ES" sz="1800" spc="-1" strike="noStrike">
+                <a:latin typeface="Arial"/>
+              </a:rPr>
+              <a:t>Yes</a:t>
+            </a:r>
+            <a:endParaRPr b="0" lang="es-ES" sz="1800" spc="-1" strike="noStrike">
+              <a:latin typeface="Arial"/>
+            </a:endParaRPr>
+          </a:p>
+        </p:txBody>
+      </p:sp>
+      <p:sp>
+        <p:nvSpPr>
+          <p:cNvPr id="89" name=""/>
+          <p:cNvSpPr/>
+          <p:nvPr/>
+        </p:nvSpPr>
+        <p:spPr>
+          <a:xfrm>
+            <a:off x="2268000" y="9000000"/>
+            <a:ext cx="1260000" cy="360000"/>
+          </a:xfrm>
+          <a:prstGeom prst="rect">
+            <a:avLst/>
+          </a:prstGeom>
+          <a:solidFill>
+            <a:srgbClr val="729fcf"/>
+          </a:solidFill>
+          <a:ln w="0">
+            <a:solidFill>
+              <a:srgbClr val="3465a4"/>
+            </a:solidFill>
+          </a:ln>
+        </p:spPr>
+        <p:style>
+          <a:lnRef idx="0"/>
+          <a:fillRef idx="0"/>
+          <a:effectRef idx="0"/>
+          <a:fontRef idx="minor"/>
+        </p:style>
+        <p:txBody>
+          <a:bodyPr lIns="18000" rIns="18000" tIns="10800" bIns="10800" anchor="ctr">
+            <a:noAutofit/>
+          </a:bodyPr>
+          <a:p>
+            <a:pPr algn="ctr">
+              <a:buNone/>
+            </a:pPr>
+            <a:r>
+              <a:rPr b="0" lang="es-ES" sz="1000" spc="-1" strike="noStrike">
+                <a:latin typeface="Arial"/>
+              </a:rPr>
+              <a:t>Kill thread</a:t>
+            </a:r>
+            <a:endParaRPr b="0" lang="es-ES" sz="1000" spc="-1" strike="noStrike">
+              <a:latin typeface="Arial"/>
+            </a:endParaRPr>
+          </a:p>
+        </p:txBody>
+      </p:sp>
+      <p:cxnSp>
+        <p:nvCxnSpPr>
+          <p:cNvPr id="90" name=""/>
+          <p:cNvCxnSpPr>
+            <a:stCxn id="85" idx="2"/>
+            <a:endCxn id="89" idx="0"/>
+          </p:cNvCxnSpPr>
+          <p:nvPr/>
+        </p:nvCxnSpPr>
+        <p:spPr>
+          <a:xfrm>
+            <a:off x="2892600" y="8150400"/>
+            <a:ext cx="5760" cy="849960"/>
+          </a:xfrm>
+          <a:prstGeom prst="straightConnector1">
+            <a:avLst/>
+          </a:prstGeom>
+          <a:ln w="0">
+            <a:solidFill>
+              <a:srgbClr val="3465a4"/>
+            </a:solidFill>
+            <a:tailEnd len="med" type="triangle" w="med"/>
+          </a:ln>
+        </p:spPr>
+      </p:cxnSp>
+      <p:sp>
+        <p:nvSpPr>
+          <p:cNvPr id="91" name=""/>
+          <p:cNvSpPr txBox="1"/>
+          <p:nvPr/>
+        </p:nvSpPr>
+        <p:spPr>
+          <a:xfrm>
+            <a:off x="3068280" y="199080"/>
+            <a:ext cx="2340000" cy="2069640"/>
+          </a:xfrm>
+          <a:prstGeom prst="rect">
+            <a:avLst/>
+          </a:prstGeom>
+          <a:noFill/>
+          <a:ln w="0">
+            <a:noFill/>
+          </a:ln>
+        </p:spPr>
+        <p:txBody>
+          <a:bodyPr lIns="18000" rIns="18000" tIns="10800" bIns="10800" anchor="t">
+            <a:noAutofit/>
+          </a:bodyPr>
+          <a:p>
+            <a:r>
+              <a:rPr b="0" lang="es-ES" sz="1800" spc="-1" strike="noStrike">
+                <a:latin typeface="Arial"/>
+              </a:rPr>
+              <a:t>Opción 2_ Cuando el servidor envia la información reuqerida, cierra el puerto y hace un kill del thread.</a:t>
+            </a:r>
+            <a:endParaRPr b="0" lang="es-ES" sz="1800" spc="-1" strike="noStrike">
+              <a:latin typeface="Arial"/>
+            </a:endParaRPr>
+          </a:p>
+          <a:p>
+            <a:r>
+              <a:rPr b="0" lang="es-ES" sz="1800" spc="-1" strike="noStrike">
+                <a:latin typeface="Arial"/>
+              </a:rPr>
+              <a:t>Quizás esta sea la forma mas lógica de realizar la labor.</a:t>
             </a:r>
             <a:endParaRPr b="0" lang="es-ES" sz="1800" spc="-1" strike="noStrike">
               <a:latin typeface="Arial"/>

</xml_diff>